<commit_message>
Minor fixes to some of the presentations.
</commit_message>
<xml_diff>
--- a/final-presentations/2021-03-25-iss/05-design.pptx
+++ b/final-presentations/2021-03-25-iss/05-design.pptx
@@ -271,7 +271,7 @@
           <a:p>
             <a:fld id="{0B842F42-2CE9-4E35-95C1-410DC08A50B1}" type="datetimeFigureOut">
               <a:rPr lang="en-US" smtClean="0"/>
-              <a:t>3/21/2021</a:t>
+              <a:t>3/22/2021</a:t>
             </a:fld>
             <a:endParaRPr lang="en-US"/>
           </a:p>
@@ -436,7 +436,7 @@
           <a:p>
             <a:fld id="{6F282904-F315-4730-8D91-37D99E141A6F}" type="datetimeFigureOut">
               <a:rPr lang="en-US" smtClean="0"/>
-              <a:t>3/21/2021</a:t>
+              <a:t>3/22/2021</a:t>
             </a:fld>
             <a:endParaRPr lang="en-US"/>
           </a:p>
@@ -1645,7 +1645,7 @@
           <a:noFill/>
           <a:extLst>
             <a:ext uri="{909E8E84-426E-40dd-AFC4-6F175D3DCCD1}">
-              <a14:hiddenFill xmlns:a14="http://schemas.microsoft.com/office/drawing/2010/main" xmlns="">
+              <a14:hiddenFill xmlns="" xmlns:a14="http://schemas.microsoft.com/office/drawing/2010/main">
                 <a:solidFill>
                   <a:srgbClr val="FFFFFF"/>
                 </a:solidFill>
@@ -1799,7 +1799,7 @@
           <a:noFill/>
           <a:extLst>
             <a:ext uri="{909E8E84-426E-40dd-AFC4-6F175D3DCCD1}">
-              <a14:hiddenFill xmlns:a14="http://schemas.microsoft.com/office/drawing/2010/main" xmlns="">
+              <a14:hiddenFill xmlns="" xmlns:a14="http://schemas.microsoft.com/office/drawing/2010/main">
                 <a:solidFill>
                   <a:srgbClr val="FFFFFF"/>
                 </a:solidFill>
@@ -2219,7 +2219,7 @@
           <a:p>
             <a:fld id="{68F49DD1-DDB5-AB43-B311-7649AD474C82}" type="datetimeFigureOut">
               <a:rPr lang="en-US" smtClean="0"/>
-              <a:t>3/21/2021</a:t>
+              <a:t>3/22/2021</a:t>
             </a:fld>
             <a:endParaRPr lang="en-US"/>
           </a:p>
@@ -11615,43 +11615,6 @@
       </p:grpSp>
       <p:sp>
         <p:nvSpPr>
-          <p:cNvPr id="21" name="Slide Number Placeholder 4">
-            <a:extLst>
-              <a:ext uri="{FF2B5EF4-FFF2-40B4-BE49-F238E27FC236}">
-                <a16:creationId xmlns:a16="http://schemas.microsoft.com/office/drawing/2014/main" id="{EB004F76-44C9-7A4D-9792-F1AB05167BF9}"/>
-              </a:ext>
-            </a:extLst>
-          </p:cNvPr>
-          <p:cNvSpPr>
-            <a:spLocks noGrp="1"/>
-          </p:cNvSpPr>
-          <p:nvPr>
-            <p:ph type="sldNum" sz="quarter" idx="12"/>
-          </p:nvPr>
-        </p:nvSpPr>
-        <p:spPr>
-          <a:xfrm>
-            <a:off x="9980612" y="6400800"/>
-            <a:ext cx="457200" cy="274320"/>
-          </a:xfrm>
-        </p:spPr>
-        <p:txBody>
-          <a:bodyPr>
-            <a:normAutofit fontScale="85000" lnSpcReduction="20000"/>
-          </a:bodyPr>
-          <a:lstStyle/>
-          <a:p>
-            <a:fld id="{AEFAAC5A-9C4F-4278-920D-DF2BAB595749}" type="slidenum">
-              <a:rPr lang="en-US" smtClean="0"/>
-              <a:pPr/>
-              <a:t>13</a:t>
-            </a:fld>
-            <a:endParaRPr lang="en-US" dirty="0"/>
-          </a:p>
-        </p:txBody>
-      </p:sp>
-      <p:sp>
-        <p:nvSpPr>
           <p:cNvPr id="17" name="Title 1">
             <a:extLst>
               <a:ext uri="{FF2B5EF4-FFF2-40B4-BE49-F238E27FC236}">
@@ -18074,43 +18037,6 @@
       </p:grpSp>
       <p:sp>
         <p:nvSpPr>
-          <p:cNvPr id="21" name="Slide Number Placeholder 4">
-            <a:extLst>
-              <a:ext uri="{FF2B5EF4-FFF2-40B4-BE49-F238E27FC236}">
-                <a16:creationId xmlns:a16="http://schemas.microsoft.com/office/drawing/2014/main" id="{EB004F76-44C9-7A4D-9792-F1AB05167BF9}"/>
-              </a:ext>
-            </a:extLst>
-          </p:cNvPr>
-          <p:cNvSpPr>
-            <a:spLocks noGrp="1"/>
-          </p:cNvSpPr>
-          <p:nvPr>
-            <p:ph type="sldNum" sz="quarter" idx="12"/>
-          </p:nvPr>
-        </p:nvSpPr>
-        <p:spPr>
-          <a:xfrm>
-            <a:off x="9980612" y="6400800"/>
-            <a:ext cx="457200" cy="274320"/>
-          </a:xfrm>
-        </p:spPr>
-        <p:txBody>
-          <a:bodyPr>
-            <a:normAutofit fontScale="85000" lnSpcReduction="20000"/>
-          </a:bodyPr>
-          <a:lstStyle/>
-          <a:p>
-            <a:fld id="{AEFAAC5A-9C4F-4278-920D-DF2BAB595749}" type="slidenum">
-              <a:rPr lang="en-US" smtClean="0"/>
-              <a:pPr/>
-              <a:t>3</a:t>
-            </a:fld>
-            <a:endParaRPr lang="en-US" dirty="0"/>
-          </a:p>
-        </p:txBody>
-      </p:sp>
-      <p:sp>
-        <p:nvSpPr>
           <p:cNvPr id="17" name="Title 1">
             <a:extLst>
               <a:ext uri="{FF2B5EF4-FFF2-40B4-BE49-F238E27FC236}">
@@ -22171,270 +22097,6 @@
       </p:grpSpPr>
       <p:sp>
         <p:nvSpPr>
-          <p:cNvPr id="4" name="Date Placeholder 3">
-            <a:extLst>
-              <a:ext uri="{FF2B5EF4-FFF2-40B4-BE49-F238E27FC236}">
-                <a16:creationId xmlns:a16="http://schemas.microsoft.com/office/drawing/2014/main" id="{B2C88E49-3CEB-584A-AFB2-5B51EA707452}"/>
-              </a:ext>
-            </a:extLst>
-          </p:cNvPr>
-          <p:cNvSpPr>
-            <a:spLocks noGrp="1"/>
-          </p:cNvSpPr>
-          <p:nvPr>
-            <p:ph type="dt" sz="half" idx="10"/>
-          </p:nvPr>
-        </p:nvSpPr>
-        <p:spPr>
-          <a:xfrm>
-            <a:off x="6858000" y="6356350"/>
-            <a:ext cx="1600200" cy="274320"/>
-          </a:xfrm>
-          <a:prstGeom prst="rect">
-            <a:avLst/>
-          </a:prstGeom>
-        </p:spPr>
-        <p:txBody>
-          <a:bodyPr vert="horz" lIns="91440" tIns="45720" rIns="91440" bIns="45720" rtlCol="0" anchor="ctr" anchorCtr="0"/>
-          <a:lstStyle>
-            <a:defPPr>
-              <a:defRPr lang="en-US"/>
-            </a:defPPr>
-            <a:lvl1pPr marL="0" algn="r" defTabSz="914400" rtl="0" eaLnBrk="1" latinLnBrk="0" hangingPunct="1">
-              <a:defRPr sz="1100" kern="1200">
-                <a:solidFill>
-                  <a:schemeClr val="tx1"/>
-                </a:solidFill>
-                <a:latin typeface="Arial" panose="020B0604020202020204" pitchFamily="34" charset="0"/>
-                <a:ea typeface="+mn-ea"/>
-                <a:cs typeface="Arial" panose="020B0604020202020204" pitchFamily="34" charset="0"/>
-              </a:defRPr>
-            </a:lvl1pPr>
-            <a:lvl2pPr marL="457200" algn="l" defTabSz="914400" rtl="0" eaLnBrk="1" latinLnBrk="0" hangingPunct="1">
-              <a:defRPr sz="1800" kern="1200">
-                <a:solidFill>
-                  <a:schemeClr val="tx1"/>
-                </a:solidFill>
-                <a:latin typeface="+mn-lt"/>
-                <a:ea typeface="+mn-ea"/>
-                <a:cs typeface="+mn-cs"/>
-              </a:defRPr>
-            </a:lvl2pPr>
-            <a:lvl3pPr marL="914400" algn="l" defTabSz="914400" rtl="0" eaLnBrk="1" latinLnBrk="0" hangingPunct="1">
-              <a:defRPr sz="1800" kern="1200">
-                <a:solidFill>
-                  <a:schemeClr val="tx1"/>
-                </a:solidFill>
-                <a:latin typeface="+mn-lt"/>
-                <a:ea typeface="+mn-ea"/>
-                <a:cs typeface="+mn-cs"/>
-              </a:defRPr>
-            </a:lvl3pPr>
-            <a:lvl4pPr marL="1371600" algn="l" defTabSz="914400" rtl="0" eaLnBrk="1" latinLnBrk="0" hangingPunct="1">
-              <a:defRPr sz="1800" kern="1200">
-                <a:solidFill>
-                  <a:schemeClr val="tx1"/>
-                </a:solidFill>
-                <a:latin typeface="+mn-lt"/>
-                <a:ea typeface="+mn-ea"/>
-                <a:cs typeface="+mn-cs"/>
-              </a:defRPr>
-            </a:lvl4pPr>
-            <a:lvl5pPr marL="1828800" algn="l" defTabSz="914400" rtl="0" eaLnBrk="1" latinLnBrk="0" hangingPunct="1">
-              <a:defRPr sz="1800" kern="1200">
-                <a:solidFill>
-                  <a:schemeClr val="tx1"/>
-                </a:solidFill>
-                <a:latin typeface="+mn-lt"/>
-                <a:ea typeface="+mn-ea"/>
-                <a:cs typeface="+mn-cs"/>
-              </a:defRPr>
-            </a:lvl5pPr>
-            <a:lvl6pPr marL="2286000" algn="l" defTabSz="914400" rtl="0" eaLnBrk="1" latinLnBrk="0" hangingPunct="1">
-              <a:defRPr sz="1800" kern="1200">
-                <a:solidFill>
-                  <a:schemeClr val="tx1"/>
-                </a:solidFill>
-                <a:latin typeface="+mn-lt"/>
-                <a:ea typeface="+mn-ea"/>
-                <a:cs typeface="+mn-cs"/>
-              </a:defRPr>
-            </a:lvl6pPr>
-            <a:lvl7pPr marL="2743200" algn="l" defTabSz="914400" rtl="0" eaLnBrk="1" latinLnBrk="0" hangingPunct="1">
-              <a:defRPr sz="1800" kern="1200">
-                <a:solidFill>
-                  <a:schemeClr val="tx1"/>
-                </a:solidFill>
-                <a:latin typeface="+mn-lt"/>
-                <a:ea typeface="+mn-ea"/>
-                <a:cs typeface="+mn-cs"/>
-              </a:defRPr>
-            </a:lvl7pPr>
-            <a:lvl8pPr marL="3200400" algn="l" defTabSz="914400" rtl="0" eaLnBrk="1" latinLnBrk="0" hangingPunct="1">
-              <a:defRPr sz="1800" kern="1200">
-                <a:solidFill>
-                  <a:schemeClr val="tx1"/>
-                </a:solidFill>
-                <a:latin typeface="+mn-lt"/>
-                <a:ea typeface="+mn-ea"/>
-                <a:cs typeface="+mn-cs"/>
-              </a:defRPr>
-            </a:lvl8pPr>
-            <a:lvl9pPr marL="3657600" algn="l" defTabSz="914400" rtl="0" eaLnBrk="1" latinLnBrk="0" hangingPunct="1">
-              <a:defRPr sz="1800" kern="1200">
-                <a:solidFill>
-                  <a:schemeClr val="tx1"/>
-                </a:solidFill>
-                <a:latin typeface="+mn-lt"/>
-                <a:ea typeface="+mn-ea"/>
-                <a:cs typeface="+mn-cs"/>
-              </a:defRPr>
-            </a:lvl9pPr>
-          </a:lstStyle>
-          <a:p>
-            <a:fld id="{B557289E-1B3F-4E63-935A-0E0E5EBBCF05}" type="datetime1">
-              <a:rPr lang="en-US" smtClean="0"/>
-              <a:pPr/>
-              <a:t>3/21/2021</a:t>
-            </a:fld>
-            <a:endParaRPr lang="en-US"/>
-          </a:p>
-        </p:txBody>
-      </p:sp>
-      <p:sp>
-        <p:nvSpPr>
-          <p:cNvPr id="5" name="Slide Number Placeholder 4">
-            <a:extLst>
-              <a:ext uri="{FF2B5EF4-FFF2-40B4-BE49-F238E27FC236}">
-                <a16:creationId xmlns:a16="http://schemas.microsoft.com/office/drawing/2014/main" id="{B05AEFD1-E907-E749-8CE9-8AC2C9DDB011}"/>
-              </a:ext>
-            </a:extLst>
-          </p:cNvPr>
-          <p:cNvSpPr>
-            <a:spLocks noGrp="1"/>
-          </p:cNvSpPr>
-          <p:nvPr>
-            <p:ph type="sldNum" sz="quarter" idx="12"/>
-          </p:nvPr>
-        </p:nvSpPr>
-        <p:spPr>
-          <a:xfrm>
-            <a:off x="8458200" y="6356350"/>
-            <a:ext cx="457200" cy="274320"/>
-          </a:xfrm>
-          <a:prstGeom prst="rect">
-            <a:avLst/>
-          </a:prstGeom>
-        </p:spPr>
-        <p:txBody>
-          <a:bodyPr vert="horz" lIns="91440" tIns="45720" rIns="91440" bIns="45720" rtlCol="0" anchor="ctr" anchorCtr="0"/>
-          <a:lstStyle>
-            <a:defPPr>
-              <a:defRPr lang="en-US"/>
-            </a:defPPr>
-            <a:lvl1pPr marL="0" algn="r" defTabSz="914400" rtl="0" eaLnBrk="1" latinLnBrk="0" hangingPunct="1">
-              <a:defRPr sz="1100" kern="1200">
-                <a:solidFill>
-                  <a:schemeClr val="tx1"/>
-                </a:solidFill>
-                <a:latin typeface="Arial" panose="020B0604020202020204" pitchFamily="34" charset="0"/>
-                <a:ea typeface="+mn-ea"/>
-                <a:cs typeface="Arial" panose="020B0604020202020204" pitchFamily="34" charset="0"/>
-              </a:defRPr>
-            </a:lvl1pPr>
-            <a:lvl2pPr marL="457200" algn="l" defTabSz="914400" rtl="0" eaLnBrk="1" latinLnBrk="0" hangingPunct="1">
-              <a:defRPr sz="1800" kern="1200">
-                <a:solidFill>
-                  <a:schemeClr val="tx1"/>
-                </a:solidFill>
-                <a:latin typeface="+mn-lt"/>
-                <a:ea typeface="+mn-ea"/>
-                <a:cs typeface="+mn-cs"/>
-              </a:defRPr>
-            </a:lvl2pPr>
-            <a:lvl3pPr marL="914400" algn="l" defTabSz="914400" rtl="0" eaLnBrk="1" latinLnBrk="0" hangingPunct="1">
-              <a:defRPr sz="1800" kern="1200">
-                <a:solidFill>
-                  <a:schemeClr val="tx1"/>
-                </a:solidFill>
-                <a:latin typeface="+mn-lt"/>
-                <a:ea typeface="+mn-ea"/>
-                <a:cs typeface="+mn-cs"/>
-              </a:defRPr>
-            </a:lvl3pPr>
-            <a:lvl4pPr marL="1371600" algn="l" defTabSz="914400" rtl="0" eaLnBrk="1" latinLnBrk="0" hangingPunct="1">
-              <a:defRPr sz="1800" kern="1200">
-                <a:solidFill>
-                  <a:schemeClr val="tx1"/>
-                </a:solidFill>
-                <a:latin typeface="+mn-lt"/>
-                <a:ea typeface="+mn-ea"/>
-                <a:cs typeface="+mn-cs"/>
-              </a:defRPr>
-            </a:lvl4pPr>
-            <a:lvl5pPr marL="1828800" algn="l" defTabSz="914400" rtl="0" eaLnBrk="1" latinLnBrk="0" hangingPunct="1">
-              <a:defRPr sz="1800" kern="1200">
-                <a:solidFill>
-                  <a:schemeClr val="tx1"/>
-                </a:solidFill>
-                <a:latin typeface="+mn-lt"/>
-                <a:ea typeface="+mn-ea"/>
-                <a:cs typeface="+mn-cs"/>
-              </a:defRPr>
-            </a:lvl5pPr>
-            <a:lvl6pPr marL="2286000" algn="l" defTabSz="914400" rtl="0" eaLnBrk="1" latinLnBrk="0" hangingPunct="1">
-              <a:defRPr sz="1800" kern="1200">
-                <a:solidFill>
-                  <a:schemeClr val="tx1"/>
-                </a:solidFill>
-                <a:latin typeface="+mn-lt"/>
-                <a:ea typeface="+mn-ea"/>
-                <a:cs typeface="+mn-cs"/>
-              </a:defRPr>
-            </a:lvl6pPr>
-            <a:lvl7pPr marL="2743200" algn="l" defTabSz="914400" rtl="0" eaLnBrk="1" latinLnBrk="0" hangingPunct="1">
-              <a:defRPr sz="1800" kern="1200">
-                <a:solidFill>
-                  <a:schemeClr val="tx1"/>
-                </a:solidFill>
-                <a:latin typeface="+mn-lt"/>
-                <a:ea typeface="+mn-ea"/>
-                <a:cs typeface="+mn-cs"/>
-              </a:defRPr>
-            </a:lvl7pPr>
-            <a:lvl8pPr marL="3200400" algn="l" defTabSz="914400" rtl="0" eaLnBrk="1" latinLnBrk="0" hangingPunct="1">
-              <a:defRPr sz="1800" kern="1200">
-                <a:solidFill>
-                  <a:schemeClr val="tx1"/>
-                </a:solidFill>
-                <a:latin typeface="+mn-lt"/>
-                <a:ea typeface="+mn-ea"/>
-                <a:cs typeface="+mn-cs"/>
-              </a:defRPr>
-            </a:lvl8pPr>
-            <a:lvl9pPr marL="3657600" algn="l" defTabSz="914400" rtl="0" eaLnBrk="1" latinLnBrk="0" hangingPunct="1">
-              <a:defRPr sz="1800" kern="1200">
-                <a:solidFill>
-                  <a:schemeClr val="tx1"/>
-                </a:solidFill>
-                <a:latin typeface="+mn-lt"/>
-                <a:ea typeface="+mn-ea"/>
-                <a:cs typeface="+mn-cs"/>
-              </a:defRPr>
-            </a:lvl9pPr>
-          </a:lstStyle>
-          <a:p>
-            <a:fld id="{AEFAAC5A-9C4F-4278-920D-DF2BAB595749}" type="slidenum">
-              <a:rPr lang="en-US" smtClean="0"/>
-              <a:pPr/>
-              <a:t>9</a:t>
-            </a:fld>
-            <a:endParaRPr lang="en-US" dirty="0"/>
-          </a:p>
-        </p:txBody>
-      </p:sp>
-      <p:sp>
-        <p:nvSpPr>
           <p:cNvPr id="8" name="Title 1">
             <a:extLst>
               <a:ext uri="{FF2B5EF4-FFF2-40B4-BE49-F238E27FC236}">
@@ -23715,6 +23377,15 @@
 </file>
 
 <file path=customXml/item1.xml><?xml version="1.0" encoding="utf-8"?>
+<?mso-contentType ?>
+<FormTemplates xmlns="http://schemas.microsoft.com/sharepoint/v3/contenttype/forms">
+  <Display>DocumentLibraryForm</Display>
+  <Edit>DocumentLibraryForm</Edit>
+  <New>DocumentLibraryForm</New>
+</FormTemplates>
+</file>
+
+<file path=customXml/item2.xml><?xml version="1.0" encoding="utf-8"?>
 <ct:contentTypeSchema xmlns:ct="http://schemas.microsoft.com/office/2006/metadata/contentType" xmlns:ma="http://schemas.microsoft.com/office/2006/metadata/properties/metaAttributes" ct:_="" ma:_="" ma:contentTypeName="Document" ma:contentTypeID="0x010100565464437F680748A68B85EB6594EA7D" ma:contentTypeVersion="0" ma:contentTypeDescription="Create a new document." ma:contentTypeScope="" ma:versionID="fe3f4dd58d5914c51cfc6deaa8ad845c">
   <xsd:schema xmlns:xsd="http://www.w3.org/2001/XMLSchema" xmlns:p="http://schemas.microsoft.com/office/2006/metadata/properties" targetNamespace="http://schemas.microsoft.com/office/2006/metadata/properties" ma:root="true" ma:fieldsID="4aeb20c0e3442673af7ee10786458764">
     <xsd:element name="properties">
@@ -23763,15 +23434,6 @@
 </ct:contentTypeSchema>
 </file>
 
-<file path=customXml/item2.xml><?xml version="1.0" encoding="utf-8"?>
-<?mso-contentType ?>
-<FormTemplates xmlns="http://schemas.microsoft.com/sharepoint/v3/contenttype/forms">
-  <Display>DocumentLibraryForm</Display>
-  <Edit>DocumentLibraryForm</Edit>
-  <New>DocumentLibraryForm</New>
-</FormTemplates>
-</file>
-
 <file path=customXml/item3.xml><?xml version="1.0" encoding="utf-8"?>
 <p:properties xmlns:p="http://schemas.microsoft.com/office/2006/metadata/properties" xmlns:xsi="http://www.w3.org/2001/XMLSchema-instance" xmlns:pc="http://schemas.microsoft.com/office/infopath/2007/PartnerControls">
   <documentManagement/>
@@ -23779,6 +23441,14 @@
 </file>
 
 <file path=customXml/itemProps1.xml><?xml version="1.0" encoding="utf-8"?>
+<ds:datastoreItem xmlns:ds="http://schemas.openxmlformats.org/officeDocument/2006/customXml" ds:itemID="{19E20559-B232-4371-8690-E3D8007EDB82}">
+  <ds:schemaRefs>
+    <ds:schemaRef ds:uri="http://schemas.microsoft.com/sharepoint/v3/contenttype/forms"/>
+  </ds:schemaRefs>
+</ds:datastoreItem>
+</file>
+
+<file path=customXml/itemProps2.xml><?xml version="1.0" encoding="utf-8"?>
 <ds:datastoreItem xmlns:ds="http://schemas.openxmlformats.org/officeDocument/2006/customXml" ds:itemID="{E8DB7DEB-074E-4EE8-9B6E-FD277323109C}">
   <ds:schemaRefs>
     <ds:schemaRef ds:uri="http://schemas.microsoft.com/office/2006/metadata/contentType"/>
@@ -23789,14 +23459,6 @@
     <ds:schemaRef ds:uri="http://purl.org/dc/elements/1.1/"/>
     <ds:schemaRef ds:uri="http://purl.org/dc/terms/"/>
     <ds:schemaRef ds:uri="http://schemas.microsoft.com/office/internal/2005/internalDocumentation"/>
-  </ds:schemaRefs>
-</ds:datastoreItem>
-</file>
-
-<file path=customXml/itemProps2.xml><?xml version="1.0" encoding="utf-8"?>
-<ds:datastoreItem xmlns:ds="http://schemas.openxmlformats.org/officeDocument/2006/customXml" ds:itemID="{19E20559-B232-4371-8690-E3D8007EDB82}">
-  <ds:schemaRefs>
-    <ds:schemaRef ds:uri="http://schemas.microsoft.com/sharepoint/v3/contenttype/forms"/>
   </ds:schemaRefs>
 </ds:datastoreItem>
 </file>

</xml_diff>